<commit_message>
prezentation wprowadzenie w dziedzine problemową
</commit_message>
<xml_diff>
--- a/Nawigacja w grach komputerowych.pptx
+++ b/Nawigacja w grach komputerowych.pptx
@@ -270,11 +270,11 @@
         </c:dLbls>
         <c:gapWidth val="75"/>
         <c:overlap val="-25"/>
-        <c:axId val="106748928"/>
-        <c:axId val="46330624"/>
+        <c:axId val="95481216"/>
+        <c:axId val="36312192"/>
       </c:barChart>
       <c:catAx>
-        <c:axId val="106748928"/>
+        <c:axId val="95481216"/>
         <c:scaling>
           <c:orientation val="minMax"/>
         </c:scaling>
@@ -283,7 +283,7 @@
         <c:majorTickMark val="none"/>
         <c:minorTickMark val="none"/>
         <c:tickLblPos val="nextTo"/>
-        <c:crossAx val="46330624"/>
+        <c:crossAx val="36312192"/>
         <c:crosses val="autoZero"/>
         <c:auto val="1"/>
         <c:lblAlgn val="ctr"/>
@@ -291,7 +291,7 @@
         <c:noMultiLvlLbl val="0"/>
       </c:catAx>
       <c:valAx>
-        <c:axId val="46330624"/>
+        <c:axId val="36312192"/>
         <c:scaling>
           <c:orientation val="minMax"/>
         </c:scaling>
@@ -331,7 +331,7 @@
             <a:noFill/>
           </a:ln>
         </c:spPr>
-        <c:crossAx val="106748928"/>
+        <c:crossAx val="95481216"/>
         <c:crosses val="autoZero"/>
         <c:crossBetween val="between"/>
       </c:valAx>
@@ -501,11 +501,11 @@
         </c:dLbls>
         <c:gapWidth val="75"/>
         <c:overlap val="-25"/>
-        <c:axId val="66620032"/>
-        <c:axId val="107385216"/>
+        <c:axId val="36342784"/>
+        <c:axId val="36344576"/>
       </c:barChart>
       <c:catAx>
-        <c:axId val="66620032"/>
+        <c:axId val="36342784"/>
         <c:scaling>
           <c:orientation val="minMax"/>
         </c:scaling>
@@ -514,7 +514,7 @@
         <c:majorTickMark val="none"/>
         <c:minorTickMark val="none"/>
         <c:tickLblPos val="nextTo"/>
-        <c:crossAx val="107385216"/>
+        <c:crossAx val="36344576"/>
         <c:crosses val="autoZero"/>
         <c:auto val="1"/>
         <c:lblAlgn val="ctr"/>
@@ -522,7 +522,7 @@
         <c:noMultiLvlLbl val="0"/>
       </c:catAx>
       <c:valAx>
-        <c:axId val="107385216"/>
+        <c:axId val="36344576"/>
         <c:scaling>
           <c:orientation val="minMax"/>
         </c:scaling>
@@ -557,7 +557,7 @@
             <a:noFill/>
           </a:ln>
         </c:spPr>
-        <c:crossAx val="66620032"/>
+        <c:crossAx val="36342784"/>
         <c:crosses val="autoZero"/>
         <c:crossBetween val="between"/>
       </c:valAx>
@@ -727,11 +727,11 @@
         </c:dLbls>
         <c:gapWidth val="75"/>
         <c:overlap val="-25"/>
-        <c:axId val="47515904"/>
-        <c:axId val="47529984"/>
+        <c:axId val="36645504"/>
+        <c:axId val="36655488"/>
       </c:barChart>
       <c:catAx>
-        <c:axId val="47515904"/>
+        <c:axId val="36645504"/>
         <c:scaling>
           <c:orientation val="minMax"/>
         </c:scaling>
@@ -740,7 +740,7 @@
         <c:majorTickMark val="none"/>
         <c:minorTickMark val="none"/>
         <c:tickLblPos val="nextTo"/>
-        <c:crossAx val="47529984"/>
+        <c:crossAx val="36655488"/>
         <c:crosses val="autoZero"/>
         <c:auto val="1"/>
         <c:lblAlgn val="ctr"/>
@@ -748,7 +748,7 @@
         <c:noMultiLvlLbl val="0"/>
       </c:catAx>
       <c:valAx>
-        <c:axId val="47529984"/>
+        <c:axId val="36655488"/>
         <c:scaling>
           <c:orientation val="minMax"/>
         </c:scaling>
@@ -783,7 +783,7 @@
             <a:noFill/>
           </a:ln>
         </c:spPr>
-        <c:crossAx val="47515904"/>
+        <c:crossAx val="36645504"/>
         <c:crosses val="autoZero"/>
         <c:crossBetween val="between"/>
       </c:valAx>
@@ -948,11 +948,11 @@
         </c:dLbls>
         <c:gapWidth val="75"/>
         <c:overlap val="-25"/>
-        <c:axId val="47552384"/>
-        <c:axId val="47553920"/>
+        <c:axId val="36677888"/>
+        <c:axId val="36679680"/>
       </c:barChart>
       <c:catAx>
-        <c:axId val="47552384"/>
+        <c:axId val="36677888"/>
         <c:scaling>
           <c:orientation val="minMax"/>
         </c:scaling>
@@ -961,7 +961,7 @@
         <c:majorTickMark val="none"/>
         <c:minorTickMark val="none"/>
         <c:tickLblPos val="nextTo"/>
-        <c:crossAx val="47553920"/>
+        <c:crossAx val="36679680"/>
         <c:crosses val="autoZero"/>
         <c:auto val="1"/>
         <c:lblAlgn val="ctr"/>
@@ -969,7 +969,7 @@
         <c:noMultiLvlLbl val="0"/>
       </c:catAx>
       <c:valAx>
-        <c:axId val="47553920"/>
+        <c:axId val="36679680"/>
         <c:scaling>
           <c:orientation val="minMax"/>
         </c:scaling>
@@ -1004,7 +1004,7 @@
             <a:noFill/>
           </a:ln>
         </c:spPr>
-        <c:crossAx val="47552384"/>
+        <c:crossAx val="36677888"/>
         <c:crosses val="autoZero"/>
         <c:crossBetween val="between"/>
       </c:valAx>
@@ -1143,11 +1143,11 @@
         </c:dLbls>
         <c:gapWidth val="75"/>
         <c:overlap val="-25"/>
-        <c:axId val="47851392"/>
-        <c:axId val="47852928"/>
+        <c:axId val="36699520"/>
+        <c:axId val="36414592"/>
       </c:barChart>
       <c:catAx>
-        <c:axId val="47851392"/>
+        <c:axId val="36699520"/>
         <c:scaling>
           <c:orientation val="minMax"/>
         </c:scaling>
@@ -1156,7 +1156,7 @@
         <c:majorTickMark val="none"/>
         <c:minorTickMark val="none"/>
         <c:tickLblPos val="nextTo"/>
-        <c:crossAx val="47852928"/>
+        <c:crossAx val="36414592"/>
         <c:crosses val="autoZero"/>
         <c:auto val="1"/>
         <c:lblAlgn val="ctr"/>
@@ -1164,7 +1164,7 @@
         <c:noMultiLvlLbl val="0"/>
       </c:catAx>
       <c:valAx>
-        <c:axId val="47852928"/>
+        <c:axId val="36414592"/>
         <c:scaling>
           <c:orientation val="minMax"/>
         </c:scaling>
@@ -1200,7 +1200,7 @@
             <a:noFill/>
           </a:ln>
         </c:spPr>
-        <c:crossAx val="47851392"/>
+        <c:crossAx val="36699520"/>
         <c:crosses val="autoZero"/>
         <c:crossBetween val="between"/>
       </c:valAx>
@@ -1339,11 +1339,11 @@
         </c:dLbls>
         <c:gapWidth val="75"/>
         <c:overlap val="-25"/>
-        <c:axId val="47895296"/>
-        <c:axId val="47896832"/>
+        <c:axId val="36432128"/>
+        <c:axId val="36438016"/>
       </c:barChart>
       <c:catAx>
-        <c:axId val="47895296"/>
+        <c:axId val="36432128"/>
         <c:scaling>
           <c:orientation val="minMax"/>
         </c:scaling>
@@ -1352,7 +1352,7 @@
         <c:majorTickMark val="none"/>
         <c:minorTickMark val="none"/>
         <c:tickLblPos val="nextTo"/>
-        <c:crossAx val="47896832"/>
+        <c:crossAx val="36438016"/>
         <c:crosses val="autoZero"/>
         <c:auto val="1"/>
         <c:lblAlgn val="ctr"/>
@@ -1360,7 +1360,7 @@
         <c:noMultiLvlLbl val="0"/>
       </c:catAx>
       <c:valAx>
-        <c:axId val="47896832"/>
+        <c:axId val="36438016"/>
         <c:scaling>
           <c:orientation val="minMax"/>
         </c:scaling>
@@ -1400,7 +1400,7 @@
             <a:noFill/>
           </a:ln>
         </c:spPr>
-        <c:crossAx val="47895296"/>
+        <c:crossAx val="36432128"/>
         <c:crosses val="autoZero"/>
         <c:crossBetween val="between"/>
       </c:valAx>
@@ -1539,11 +1539,11 @@
         </c:dLbls>
         <c:gapWidth val="75"/>
         <c:overlap val="-25"/>
-        <c:axId val="47590784"/>
-        <c:axId val="47596672"/>
+        <c:axId val="36467840"/>
+        <c:axId val="36469376"/>
       </c:barChart>
       <c:catAx>
-        <c:axId val="47590784"/>
+        <c:axId val="36467840"/>
         <c:scaling>
           <c:orientation val="minMax"/>
         </c:scaling>
@@ -1552,7 +1552,7 @@
         <c:majorTickMark val="none"/>
         <c:minorTickMark val="none"/>
         <c:tickLblPos val="nextTo"/>
-        <c:crossAx val="47596672"/>
+        <c:crossAx val="36469376"/>
         <c:crosses val="autoZero"/>
         <c:auto val="1"/>
         <c:lblAlgn val="ctr"/>
@@ -1560,7 +1560,7 @@
         <c:noMultiLvlLbl val="0"/>
       </c:catAx>
       <c:valAx>
-        <c:axId val="47596672"/>
+        <c:axId val="36469376"/>
         <c:scaling>
           <c:orientation val="minMax"/>
         </c:scaling>
@@ -1600,7 +1600,7 @@
             <a:noFill/>
           </a:ln>
         </c:spPr>
-        <c:crossAx val="47590784"/>
+        <c:crossAx val="36467840"/>
         <c:crosses val="autoZero"/>
         <c:crossBetween val="between"/>
       </c:valAx>
@@ -1739,11 +1739,11 @@
         </c:dLbls>
         <c:gapWidth val="75"/>
         <c:overlap val="-25"/>
-        <c:axId val="47618304"/>
-        <c:axId val="47644672"/>
+        <c:axId val="36503552"/>
+        <c:axId val="36505088"/>
       </c:barChart>
       <c:catAx>
-        <c:axId val="47618304"/>
+        <c:axId val="36503552"/>
         <c:scaling>
           <c:orientation val="minMax"/>
         </c:scaling>
@@ -1752,7 +1752,7 @@
         <c:majorTickMark val="none"/>
         <c:minorTickMark val="none"/>
         <c:tickLblPos val="nextTo"/>
-        <c:crossAx val="47644672"/>
+        <c:crossAx val="36505088"/>
         <c:crosses val="autoZero"/>
         <c:auto val="1"/>
         <c:lblAlgn val="ctr"/>
@@ -1760,7 +1760,7 @@
         <c:noMultiLvlLbl val="0"/>
       </c:catAx>
       <c:valAx>
-        <c:axId val="47644672"/>
+        <c:axId val="36505088"/>
         <c:scaling>
           <c:orientation val="minMax"/>
         </c:scaling>
@@ -1800,7 +1800,7 @@
             <a:noFill/>
           </a:ln>
         </c:spPr>
-        <c:crossAx val="47618304"/>
+        <c:crossAx val="36503552"/>
         <c:crosses val="autoZero"/>
         <c:crossBetween val="between"/>
       </c:valAx>
@@ -1902,7 +1902,7 @@
           <a:p>
             <a:fld id="{70A2B3A7-E86D-4280-A4D7-511B8E83CF6B}" type="datetimeFigureOut">
               <a:rPr lang="pl-PL" smtClean="0"/>
-              <a:t>2013-10-27</a:t>
+              <a:t>2013-10-28</a:t>
             </a:fld>
             <a:endParaRPr lang="pl-PL"/>
           </a:p>
@@ -2608,7 +2608,25 @@
           <a:bodyPr/>
           <a:lstStyle/>
           <a:p>
-            <a:endParaRPr lang="pl-PL"/>
+            <a:r>
+              <a:rPr lang="pl-PL" dirty="0" smtClean="0"/>
+              <a:t>Chciałbym teraz dokonać krótkiego</a:t>
+            </a:r>
+            <a:r>
+              <a:rPr lang="pl-PL" baseline="0" dirty="0" smtClean="0"/>
+              <a:t> wprowadzenia do dziedziny problemowej.</a:t>
+            </a:r>
+          </a:p>
+          <a:p>
+            <a:r>
+              <a:rPr lang="pl-PL" baseline="0" dirty="0" smtClean="0"/>
+              <a:t>Nawigacja jest zagadnieniem związanym ze sztuczną inteligencją w </a:t>
+            </a:r>
+            <a:r>
+              <a:rPr lang="pl-PL" baseline="0" smtClean="0"/>
+              <a:t>grach komputerowych.</a:t>
+            </a:r>
+            <a:endParaRPr lang="pl-PL" dirty="0"/>
           </a:p>
         </p:txBody>
       </p:sp>
@@ -3365,7 +3383,7 @@
           <a:p>
             <a:fld id="{4321F2FE-F26E-4291-A147-8C4041B12D9E}" type="datetime1">
               <a:rPr lang="pl-PL" smtClean="0"/>
-              <a:t>2013-10-27</a:t>
+              <a:t>2013-10-28</a:t>
             </a:fld>
             <a:endParaRPr lang="pl-PL"/>
           </a:p>
@@ -3535,7 +3553,7 @@
           <a:p>
             <a:fld id="{83BF026A-E201-47E1-9A92-B814A9A3F327}" type="datetime1">
               <a:rPr lang="pl-PL" smtClean="0"/>
-              <a:t>2013-10-27</a:t>
+              <a:t>2013-10-28</a:t>
             </a:fld>
             <a:endParaRPr lang="pl-PL"/>
           </a:p>
@@ -3715,7 +3733,7 @@
           <a:p>
             <a:fld id="{2096C3FB-B571-473D-A281-D6B9468FAD42}" type="datetime1">
               <a:rPr lang="pl-PL" smtClean="0"/>
-              <a:t>2013-10-27</a:t>
+              <a:t>2013-10-28</a:t>
             </a:fld>
             <a:endParaRPr lang="pl-PL"/>
           </a:p>
@@ -3885,7 +3903,7 @@
           <a:p>
             <a:fld id="{44F5E471-05F4-4497-8EE2-CA2193B14556}" type="datetime1">
               <a:rPr lang="pl-PL" smtClean="0"/>
-              <a:t>2013-10-27</a:t>
+              <a:t>2013-10-28</a:t>
             </a:fld>
             <a:endParaRPr lang="pl-PL"/>
           </a:p>
@@ -4131,7 +4149,7 @@
           <a:p>
             <a:fld id="{2F0A57DC-CC62-46B3-AA63-1B42298A7AF5}" type="datetime1">
               <a:rPr lang="pl-PL" smtClean="0"/>
-              <a:t>2013-10-27</a:t>
+              <a:t>2013-10-28</a:t>
             </a:fld>
             <a:endParaRPr lang="pl-PL"/>
           </a:p>
@@ -4419,7 +4437,7 @@
           <a:p>
             <a:fld id="{9D09572B-077A-4BD2-9329-D2130395ECCA}" type="datetime1">
               <a:rPr lang="pl-PL" smtClean="0"/>
-              <a:t>2013-10-27</a:t>
+              <a:t>2013-10-28</a:t>
             </a:fld>
             <a:endParaRPr lang="pl-PL"/>
           </a:p>
@@ -4841,7 +4859,7 @@
           <a:p>
             <a:fld id="{DEC44E0D-317C-47FF-811D-ABFC76CA8076}" type="datetime1">
               <a:rPr lang="pl-PL" smtClean="0"/>
-              <a:t>2013-10-27</a:t>
+              <a:t>2013-10-28</a:t>
             </a:fld>
             <a:endParaRPr lang="pl-PL"/>
           </a:p>
@@ -4959,7 +4977,7 @@
           <a:p>
             <a:fld id="{B0C771A5-017A-43D3-B893-775F57D95F47}" type="datetime1">
               <a:rPr lang="pl-PL" smtClean="0"/>
-              <a:t>2013-10-27</a:t>
+              <a:t>2013-10-28</a:t>
             </a:fld>
             <a:endParaRPr lang="pl-PL"/>
           </a:p>
@@ -5054,7 +5072,7 @@
           <a:p>
             <a:fld id="{6BD0963F-9A63-403D-A804-3A0ED5F348B0}" type="datetime1">
               <a:rPr lang="pl-PL" smtClean="0"/>
-              <a:t>2013-10-27</a:t>
+              <a:t>2013-10-28</a:t>
             </a:fld>
             <a:endParaRPr lang="pl-PL"/>
           </a:p>
@@ -5331,7 +5349,7 @@
           <a:p>
             <a:fld id="{975ED237-9FC1-4E5C-946C-95A4C3DC1734}" type="datetime1">
               <a:rPr lang="pl-PL" smtClean="0"/>
-              <a:t>2013-10-27</a:t>
+              <a:t>2013-10-28</a:t>
             </a:fld>
             <a:endParaRPr lang="pl-PL"/>
           </a:p>
@@ -5584,7 +5602,7 @@
           <a:p>
             <a:fld id="{E40D8EE7-3B39-4567-8143-7507C31C3279}" type="datetime1">
               <a:rPr lang="pl-PL" smtClean="0"/>
-              <a:t>2013-10-27</a:t>
+              <a:t>2013-10-28</a:t>
             </a:fld>
             <a:endParaRPr lang="pl-PL"/>
           </a:p>
@@ -5797,7 +5815,7 @@
           <a:p>
             <a:fld id="{7608829D-31E7-4419-8C46-5689D5226F4A}" type="datetime1">
               <a:rPr lang="pl-PL" smtClean="0"/>
-              <a:t>2013-10-27</a:t>
+              <a:t>2013-10-28</a:t>
             </a:fld>
             <a:endParaRPr lang="pl-PL"/>
           </a:p>
@@ -6549,11 +6567,7 @@
           <a:p>
             <a:r>
               <a:rPr lang="pl-PL" dirty="0" smtClean="0"/>
-              <a:t>Cele </a:t>
-            </a:r>
-            <a:r>
-              <a:rPr lang="pl-PL" dirty="0" smtClean="0"/>
-              <a:t>pracy</a:t>
+              <a:t>Cele pracy</a:t>
             </a:r>
           </a:p>
           <a:p>
@@ -6561,7 +6575,6 @@
               <a:rPr lang="pl-PL" dirty="0" smtClean="0"/>
               <a:t>Wprowadzenie do dziedziny problemowej</a:t>
             </a:r>
-            <a:endParaRPr lang="pl-PL" dirty="0" smtClean="0"/>
           </a:p>
           <a:p>
             <a:r>
@@ -6831,11 +6844,7 @@
           <a:p>
             <a:r>
               <a:rPr lang="pl-PL" dirty="0" smtClean="0"/>
-              <a:t>Sztuczna inteligencja w grach </a:t>
-            </a:r>
-            <a:r>
-              <a:rPr lang="pl-PL" dirty="0" smtClean="0"/>
-              <a:t>komputerowych</a:t>
+              <a:t>Sztuczna inteligencja w grach komputerowych</a:t>
             </a:r>
           </a:p>
           <a:p>
@@ -6850,7 +6859,6 @@
               <a:rPr lang="pl-PL" dirty="0" smtClean="0"/>
               <a:t>Skierowany graf ważony</a:t>
             </a:r>
-            <a:endParaRPr lang="pl-PL" dirty="0" smtClean="0"/>
           </a:p>
           <a:p>
             <a:endParaRPr lang="pl-PL" dirty="0"/>

</xml_diff>

<commit_message>
zmiany - ostanie push po obronie
</commit_message>
<xml_diff>
--- a/Nawigacja w grach komputerowych.pptx
+++ b/Nawigacja w grach komputerowych.pptx
@@ -271,11 +271,11 @@
         </c:dLbls>
         <c:gapWidth val="75"/>
         <c:overlap val="-25"/>
-        <c:axId val="110930560"/>
-        <c:axId val="110940544"/>
+        <c:axId val="98540160"/>
+        <c:axId val="98554240"/>
       </c:barChart>
       <c:catAx>
-        <c:axId val="110930560"/>
+        <c:axId val="98540160"/>
         <c:scaling>
           <c:orientation val="minMax"/>
         </c:scaling>
@@ -284,7 +284,7 @@
         <c:majorTickMark val="none"/>
         <c:minorTickMark val="none"/>
         <c:tickLblPos val="nextTo"/>
-        <c:crossAx val="110940544"/>
+        <c:crossAx val="98554240"/>
         <c:crosses val="autoZero"/>
         <c:auto val="1"/>
         <c:lblAlgn val="ctr"/>
@@ -292,7 +292,7 @@
         <c:noMultiLvlLbl val="0"/>
       </c:catAx>
       <c:valAx>
-        <c:axId val="110940544"/>
+        <c:axId val="98554240"/>
         <c:scaling>
           <c:orientation val="minMax"/>
         </c:scaling>
@@ -332,7 +332,7 @@
             <a:noFill/>
           </a:ln>
         </c:spPr>
-        <c:crossAx val="110930560"/>
+        <c:crossAx val="98540160"/>
         <c:crosses val="autoZero"/>
         <c:crossBetween val="between"/>
       </c:valAx>
@@ -502,11 +502,11 @@
         </c:dLbls>
         <c:gapWidth val="75"/>
         <c:overlap val="-25"/>
-        <c:axId val="111487232"/>
-        <c:axId val="111497216"/>
+        <c:axId val="97396992"/>
+        <c:axId val="97402880"/>
       </c:barChart>
       <c:catAx>
-        <c:axId val="111487232"/>
+        <c:axId val="97396992"/>
         <c:scaling>
           <c:orientation val="minMax"/>
         </c:scaling>
@@ -515,7 +515,7 @@
         <c:majorTickMark val="none"/>
         <c:minorTickMark val="none"/>
         <c:tickLblPos val="nextTo"/>
-        <c:crossAx val="111497216"/>
+        <c:crossAx val="97402880"/>
         <c:crosses val="autoZero"/>
         <c:auto val="1"/>
         <c:lblAlgn val="ctr"/>
@@ -523,7 +523,7 @@
         <c:noMultiLvlLbl val="0"/>
       </c:catAx>
       <c:valAx>
-        <c:axId val="111497216"/>
+        <c:axId val="97402880"/>
         <c:scaling>
           <c:orientation val="minMax"/>
         </c:scaling>
@@ -558,7 +558,7 @@
             <a:noFill/>
           </a:ln>
         </c:spPr>
-        <c:crossAx val="111487232"/>
+        <c:crossAx val="97396992"/>
         <c:crosses val="autoZero"/>
         <c:crossBetween val="between"/>
       </c:valAx>
@@ -728,11 +728,11 @@
         </c:dLbls>
         <c:gapWidth val="75"/>
         <c:overlap val="-25"/>
-        <c:axId val="111536000"/>
-        <c:axId val="111537536"/>
+        <c:axId val="97445760"/>
+        <c:axId val="97447296"/>
       </c:barChart>
       <c:catAx>
-        <c:axId val="111536000"/>
+        <c:axId val="97445760"/>
         <c:scaling>
           <c:orientation val="minMax"/>
         </c:scaling>
@@ -741,7 +741,7 @@
         <c:majorTickMark val="none"/>
         <c:minorTickMark val="none"/>
         <c:tickLblPos val="nextTo"/>
-        <c:crossAx val="111537536"/>
+        <c:crossAx val="97447296"/>
         <c:crosses val="autoZero"/>
         <c:auto val="1"/>
         <c:lblAlgn val="ctr"/>
@@ -749,7 +749,7 @@
         <c:noMultiLvlLbl val="0"/>
       </c:catAx>
       <c:valAx>
-        <c:axId val="111537536"/>
+        <c:axId val="97447296"/>
         <c:scaling>
           <c:orientation val="minMax"/>
         </c:scaling>
@@ -784,7 +784,7 @@
             <a:noFill/>
           </a:ln>
         </c:spPr>
-        <c:crossAx val="111536000"/>
+        <c:crossAx val="97445760"/>
         <c:crosses val="autoZero"/>
         <c:crossBetween val="between"/>
       </c:valAx>
@@ -949,11 +949,11 @@
         </c:dLbls>
         <c:gapWidth val="75"/>
         <c:overlap val="-25"/>
-        <c:axId val="111240704"/>
-        <c:axId val="111242240"/>
+        <c:axId val="98592256"/>
+        <c:axId val="98593792"/>
       </c:barChart>
       <c:catAx>
-        <c:axId val="111240704"/>
+        <c:axId val="98592256"/>
         <c:scaling>
           <c:orientation val="minMax"/>
         </c:scaling>
@@ -962,7 +962,7 @@
         <c:majorTickMark val="none"/>
         <c:minorTickMark val="none"/>
         <c:tickLblPos val="nextTo"/>
-        <c:crossAx val="111242240"/>
+        <c:crossAx val="98593792"/>
         <c:crosses val="autoZero"/>
         <c:auto val="1"/>
         <c:lblAlgn val="ctr"/>
@@ -970,7 +970,7 @@
         <c:noMultiLvlLbl val="0"/>
       </c:catAx>
       <c:valAx>
-        <c:axId val="111242240"/>
+        <c:axId val="98593792"/>
         <c:scaling>
           <c:orientation val="minMax"/>
         </c:scaling>
@@ -1005,7 +1005,7 @@
             <a:noFill/>
           </a:ln>
         </c:spPr>
-        <c:crossAx val="111240704"/>
+        <c:crossAx val="98592256"/>
         <c:crosses val="autoZero"/>
         <c:crossBetween val="between"/>
       </c:valAx>
@@ -1144,11 +1144,11 @@
         </c:dLbls>
         <c:gapWidth val="75"/>
         <c:overlap val="-25"/>
-        <c:axId val="111282816"/>
-        <c:axId val="111284608"/>
+        <c:axId val="98630272"/>
+        <c:axId val="98963840"/>
       </c:barChart>
       <c:catAx>
-        <c:axId val="111282816"/>
+        <c:axId val="98630272"/>
         <c:scaling>
           <c:orientation val="minMax"/>
         </c:scaling>
@@ -1157,7 +1157,7 @@
         <c:majorTickMark val="none"/>
         <c:minorTickMark val="none"/>
         <c:tickLblPos val="nextTo"/>
-        <c:crossAx val="111284608"/>
+        <c:crossAx val="98963840"/>
         <c:crosses val="autoZero"/>
         <c:auto val="1"/>
         <c:lblAlgn val="ctr"/>
@@ -1165,7 +1165,7 @@
         <c:noMultiLvlLbl val="0"/>
       </c:catAx>
       <c:valAx>
-        <c:axId val="111284608"/>
+        <c:axId val="98963840"/>
         <c:scaling>
           <c:orientation val="minMax"/>
         </c:scaling>
@@ -1201,7 +1201,7 @@
             <a:noFill/>
           </a:ln>
         </c:spPr>
-        <c:crossAx val="111282816"/>
+        <c:crossAx val="98630272"/>
         <c:crosses val="autoZero"/>
         <c:crossBetween val="between"/>
       </c:valAx>
@@ -1340,11 +1340,11 @@
         </c:dLbls>
         <c:gapWidth val="75"/>
         <c:overlap val="-25"/>
-        <c:axId val="111318528"/>
-        <c:axId val="111320064"/>
+        <c:axId val="98997760"/>
+        <c:axId val="98999296"/>
       </c:barChart>
       <c:catAx>
-        <c:axId val="111318528"/>
+        <c:axId val="98997760"/>
         <c:scaling>
           <c:orientation val="minMax"/>
         </c:scaling>
@@ -1353,7 +1353,7 @@
         <c:majorTickMark val="none"/>
         <c:minorTickMark val="none"/>
         <c:tickLblPos val="nextTo"/>
-        <c:crossAx val="111320064"/>
+        <c:crossAx val="98999296"/>
         <c:crosses val="autoZero"/>
         <c:auto val="1"/>
         <c:lblAlgn val="ctr"/>
@@ -1361,7 +1361,7 @@
         <c:noMultiLvlLbl val="0"/>
       </c:catAx>
       <c:valAx>
-        <c:axId val="111320064"/>
+        <c:axId val="98999296"/>
         <c:scaling>
           <c:orientation val="minMax"/>
         </c:scaling>
@@ -1401,7 +1401,7 @@
             <a:noFill/>
           </a:ln>
         </c:spPr>
-        <c:crossAx val="111318528"/>
+        <c:crossAx val="98997760"/>
         <c:crosses val="autoZero"/>
         <c:crossBetween val="between"/>
       </c:valAx>
@@ -1540,11 +1540,11 @@
         </c:dLbls>
         <c:gapWidth val="75"/>
         <c:overlap val="-25"/>
-        <c:axId val="111366528"/>
-        <c:axId val="111368064"/>
+        <c:axId val="99299712"/>
+        <c:axId val="99301248"/>
       </c:barChart>
       <c:catAx>
-        <c:axId val="111366528"/>
+        <c:axId val="99299712"/>
         <c:scaling>
           <c:orientation val="minMax"/>
         </c:scaling>
@@ -1553,7 +1553,7 @@
         <c:majorTickMark val="none"/>
         <c:minorTickMark val="none"/>
         <c:tickLblPos val="nextTo"/>
-        <c:crossAx val="111368064"/>
+        <c:crossAx val="99301248"/>
         <c:crosses val="autoZero"/>
         <c:auto val="1"/>
         <c:lblAlgn val="ctr"/>
@@ -1561,7 +1561,7 @@
         <c:noMultiLvlLbl val="0"/>
       </c:catAx>
       <c:valAx>
-        <c:axId val="111368064"/>
+        <c:axId val="99301248"/>
         <c:scaling>
           <c:orientation val="minMax"/>
         </c:scaling>
@@ -1601,7 +1601,7 @@
             <a:noFill/>
           </a:ln>
         </c:spPr>
-        <c:crossAx val="111366528"/>
+        <c:crossAx val="99299712"/>
         <c:crosses val="autoZero"/>
         <c:crossBetween val="between"/>
       </c:valAx>
@@ -1740,11 +1740,11 @@
         </c:dLbls>
         <c:gapWidth val="75"/>
         <c:overlap val="-25"/>
-        <c:axId val="111401984"/>
-        <c:axId val="111403776"/>
+        <c:axId val="99335168"/>
+        <c:axId val="99341056"/>
       </c:barChart>
       <c:catAx>
-        <c:axId val="111401984"/>
+        <c:axId val="99335168"/>
         <c:scaling>
           <c:orientation val="minMax"/>
         </c:scaling>
@@ -1753,7 +1753,7 @@
         <c:majorTickMark val="none"/>
         <c:minorTickMark val="none"/>
         <c:tickLblPos val="nextTo"/>
-        <c:crossAx val="111403776"/>
+        <c:crossAx val="99341056"/>
         <c:crosses val="autoZero"/>
         <c:auto val="1"/>
         <c:lblAlgn val="ctr"/>
@@ -1761,7 +1761,7 @@
         <c:noMultiLvlLbl val="0"/>
       </c:catAx>
       <c:valAx>
-        <c:axId val="111403776"/>
+        <c:axId val="99341056"/>
         <c:scaling>
           <c:orientation val="minMax"/>
         </c:scaling>
@@ -1801,7 +1801,7 @@
             <a:noFill/>
           </a:ln>
         </c:spPr>
-        <c:crossAx val="111401984"/>
+        <c:crossAx val="99335168"/>
         <c:crosses val="autoZero"/>
         <c:crossBetween val="between"/>
       </c:valAx>
@@ -8727,7 +8727,15 @@
           <a:p>
             <a:r>
               <a:rPr lang="pl-PL" dirty="0" smtClean="0"/>
-              <a:t>Wyniki badań heurystyk A*</a:t>
+              <a:t>Wyniki badań </a:t>
+            </a:r>
+            <a:r>
+              <a:rPr lang="pl-PL" dirty="0" smtClean="0"/>
+              <a:t>- heurystyki </a:t>
+            </a:r>
+            <a:r>
+              <a:rPr lang="pl-PL" dirty="0" smtClean="0"/>
+              <a:t>A*</a:t>
             </a:r>
             <a:endParaRPr lang="pl-PL" dirty="0"/>
           </a:p>

</xml_diff>